<commit_message>
feat: assignment data udapte
</commit_message>
<xml_diff>
--- a/GENAI_W3.pptx
+++ b/GENAI_W3.pptx
@@ -23254,7 +23254,7 @@
         <p:spPr>
           <a:xfrm>
             <a:off x="6382833" y="4417594"/>
-            <a:ext cx="4377846" cy="1200329"/>
+            <a:ext cx="4377846" cy="1754326"/>
           </a:xfrm>
           <a:prstGeom prst="rect">
             <a:avLst/>
@@ -23281,11 +23281,18 @@
               <a:buChar char="•"/>
             </a:pPr>
             <a:r>
-              <a:rPr lang="pl-PL" dirty="0">
-                <a:latin typeface="Poppins" panose="00000500000000000000" pitchFamily="2" charset="-18"/>
-                <a:cs typeface="Poppins" panose="00000500000000000000" pitchFamily="2" charset="-18"/>
-              </a:rPr>
-              <a:t>500 </a:t>
+              <a:rPr lang="en-GB" dirty="0">
+                <a:latin typeface="Poppins" panose="00000500000000000000" pitchFamily="2" charset="-18"/>
+                <a:cs typeface="Poppins" panose="00000500000000000000" pitchFamily="2" charset="-18"/>
+              </a:rPr>
+              <a:t>1000</a:t>
+            </a:r>
+            <a:r>
+              <a:rPr lang="pl-PL" dirty="0">
+                <a:latin typeface="Poppins" panose="00000500000000000000" pitchFamily="2" charset="-18"/>
+                <a:cs typeface="Poppins" panose="00000500000000000000" pitchFamily="2" charset="-18"/>
+              </a:rPr>
+              <a:t> </a:t>
             </a:r>
             <a:r>
               <a:rPr lang="pl-PL" dirty="0" err="1">
@@ -23309,6 +23316,13 @@
               <a:t>reviews</a:t>
             </a:r>
             <a:r>
+              <a:rPr lang="en-GB" dirty="0">
+                <a:latin typeface="Poppins" panose="00000500000000000000" pitchFamily="2" charset="-18"/>
+                <a:cs typeface="Poppins" panose="00000500000000000000" pitchFamily="2" charset="-18"/>
+              </a:rPr>
+              <a:t> for hotels</a:t>
+            </a:r>
+            <a:r>
               <a:rPr lang="pl-PL" dirty="0">
                 <a:latin typeface="Poppins" panose="00000500000000000000" pitchFamily="2" charset="-18"/>
                 <a:cs typeface="Poppins" panose="00000500000000000000" pitchFamily="2" charset="-18"/>
@@ -23328,6 +23342,27 @@
                 <a:cs typeface="Poppins" panose="00000500000000000000" pitchFamily="2" charset="-18"/>
               </a:rPr>
               <a:t>labels</a:t>
+            </a:r>
+            <a:r>
+              <a:rPr lang="en-GB" dirty="0">
+                <a:latin typeface="Poppins" panose="00000500000000000000" pitchFamily="2" charset="-18"/>
+                <a:cs typeface="Poppins" panose="00000500000000000000" pitchFamily="2" charset="-18"/>
+              </a:rPr>
+              <a:t> (data\</a:t>
+            </a:r>
+            <a:r>
+              <a:rPr lang="en-GB" dirty="0" err="1">
+                <a:latin typeface="Poppins" panose="00000500000000000000" pitchFamily="2" charset="-18"/>
+                <a:cs typeface="Poppins" panose="00000500000000000000" pitchFamily="2" charset="-18"/>
+              </a:rPr>
+              <a:t>final_assignment</a:t>
+            </a:r>
+            <a:r>
+              <a:rPr lang="en-GB" dirty="0">
+                <a:latin typeface="Poppins" panose="00000500000000000000" pitchFamily="2" charset="-18"/>
+                <a:cs typeface="Poppins" panose="00000500000000000000" pitchFamily="2" charset="-18"/>
+              </a:rPr>
+              <a:t>\customer_surveys_hotels_1k.json)*</a:t>
             </a:r>
             <a:endParaRPr lang="pl-PL" dirty="0">
               <a:latin typeface="Poppins" panose="00000500000000000000" pitchFamily="2" charset="-18"/>
@@ -23378,6 +23413,41 @@
               <a:latin typeface="Poppins" panose="00000500000000000000" pitchFamily="2" charset="-18"/>
               <a:cs typeface="Poppins" panose="00000500000000000000" pitchFamily="2" charset="-18"/>
             </a:endParaRPr>
+          </a:p>
+        </p:txBody>
+      </p:sp>
+      <p:sp>
+        <p:nvSpPr>
+          <p:cNvPr id="8" name="pole tekstowe 7">
+            <a:extLst>
+              <a:ext uri="{FF2B5EF4-FFF2-40B4-BE49-F238E27FC236}">
+                <a16:creationId xmlns:a16="http://schemas.microsoft.com/office/drawing/2014/main" id="{F5FDC1C4-DDB0-A7E1-70BE-CDE3DF444219}"/>
+              </a:ext>
+            </a:extLst>
+          </p:cNvPr>
+          <p:cNvSpPr txBox="1"/>
+          <p:nvPr/>
+        </p:nvSpPr>
+        <p:spPr>
+          <a:xfrm>
+            <a:off x="242370" y="6389783"/>
+            <a:ext cx="12482111" cy="369332"/>
+          </a:xfrm>
+          <a:prstGeom prst="rect">
+            <a:avLst/>
+          </a:prstGeom>
+          <a:noFill/>
+        </p:spPr>
+        <p:txBody>
+          <a:bodyPr wrap="square" rtlCol="0">
+            <a:spAutoFit/>
+          </a:bodyPr>
+          <a:lstStyle/>
+          <a:p>
+            <a:r>
+              <a:rPr lang="en-GB" dirty="0"/>
+              <a:t>* Subsampled and balanced data from https://huggingface.co/datasets/argilla/tripadvisor-hotel-reviews</a:t>
+            </a:r>
           </a:p>
         </p:txBody>
       </p:sp>

</xml_diff>